<commit_message>
incorporated new KS data into the code and folder
</commit_message>
<xml_diff>
--- a/proposalfigure.pptx
+++ b/proposalfigure.pptx
@@ -104,7 +104,49 @@
       </a:defRPr>
     </a:lvl9pPr>
   </p:defaultTextStyle>
+  <p:extLst>
+    <p:ext uri="{EFAFB233-063F-42B5-8137-9DF3F51BA10A}">
+      <p15:sldGuideLst xmlns:p15="http://schemas.microsoft.com/office/powerpoint/2012/main"/>
+    </p:ext>
+  </p:extLst>
 </p:presentation>
+</file>
+
+<file path=ppt/changesInfos/changesInfo1.xml><?xml version="1.0" encoding="utf-8"?>
+<pc:chgInfo xmlns:a="http://schemas.openxmlformats.org/drawingml/2006/main" xmlns:r="http://schemas.openxmlformats.org/officeDocument/2006/relationships" xmlns:ac="http://schemas.microsoft.com/office/drawing/2013/main/command" xmlns:pc="http://schemas.microsoft.com/office/powerpoint/2013/main/command">
+  <pc:docChgLst>
+    <pc:chgData name="Garayburu-Caruso, Vanessa A" userId="e129c12f-749a-4310-80b6-042d2c75f741" providerId="ADAL" clId="{7213A7E9-78F3-415E-A586-CC9BC3E4D401}"/>
+    <pc:docChg chg="modSld">
+      <pc:chgData name="Garayburu-Caruso, Vanessa A" userId="e129c12f-749a-4310-80b6-042d2c75f741" providerId="ADAL" clId="{7213A7E9-78F3-415E-A586-CC9BC3E4D401}" dt="2022-03-22T20:15:36.256" v="5" actId="20577"/>
+      <pc:docMkLst>
+        <pc:docMk/>
+      </pc:docMkLst>
+      <pc:sldChg chg="modSp mod">
+        <pc:chgData name="Garayburu-Caruso, Vanessa A" userId="e129c12f-749a-4310-80b6-042d2c75f741" providerId="ADAL" clId="{7213A7E9-78F3-415E-A586-CC9BC3E4D401}" dt="2022-03-22T20:15:36.256" v="5" actId="20577"/>
+        <pc:sldMkLst>
+          <pc:docMk/>
+          <pc:sldMk cId="294783719" sldId="256"/>
+        </pc:sldMkLst>
+        <pc:spChg chg="mod">
+          <ac:chgData name="Garayburu-Caruso, Vanessa A" userId="e129c12f-749a-4310-80b6-042d2c75f741" providerId="ADAL" clId="{7213A7E9-78F3-415E-A586-CC9BC3E4D401}" dt="2022-03-22T20:04:07.041" v="3" actId="20577"/>
+          <ac:spMkLst>
+            <pc:docMk/>
+            <pc:sldMk cId="294783719" sldId="256"/>
+            <ac:spMk id="14" creationId="{11F55AE2-0C42-4B9B-9BDE-F0EA78F647AA}"/>
+          </ac:spMkLst>
+        </pc:spChg>
+        <pc:spChg chg="mod">
+          <ac:chgData name="Garayburu-Caruso, Vanessa A" userId="e129c12f-749a-4310-80b6-042d2c75f741" providerId="ADAL" clId="{7213A7E9-78F3-415E-A586-CC9BC3E4D401}" dt="2022-03-22T20:15:36.256" v="5" actId="20577"/>
+          <ac:spMkLst>
+            <pc:docMk/>
+            <pc:sldMk cId="294783719" sldId="256"/>
+            <ac:spMk id="42" creationId="{CEA6A66D-A5FD-4411-900A-165F4849A7B6}"/>
+          </ac:spMkLst>
+        </pc:spChg>
+      </pc:sldChg>
+    </pc:docChg>
+  </pc:docChgLst>
+</pc:chgInfo>
 </file>
 
 <file path=ppt/slideLayouts/slideLayout1.xml><?xml version="1.0" encoding="utf-8"?>
@@ -254,7 +296,7 @@
           <a:p>
             <a:fld id="{EB8F9C6A-9697-4BDA-BFDC-0922C08C1E4F}" type="datetimeFigureOut">
               <a:rPr lang="en-US" smtClean="0"/>
-              <a:t>3/20/2022</a:t>
+              <a:t>3/22/2022</a:t>
             </a:fld>
             <a:endParaRPr lang="en-US"/>
           </a:p>
@@ -452,7 +494,7 @@
           <a:p>
             <a:fld id="{EB8F9C6A-9697-4BDA-BFDC-0922C08C1E4F}" type="datetimeFigureOut">
               <a:rPr lang="en-US" smtClean="0"/>
-              <a:t>3/20/2022</a:t>
+              <a:t>3/22/2022</a:t>
             </a:fld>
             <a:endParaRPr lang="en-US"/>
           </a:p>
@@ -660,7 +702,7 @@
           <a:p>
             <a:fld id="{EB8F9C6A-9697-4BDA-BFDC-0922C08C1E4F}" type="datetimeFigureOut">
               <a:rPr lang="en-US" smtClean="0"/>
-              <a:t>3/20/2022</a:t>
+              <a:t>3/22/2022</a:t>
             </a:fld>
             <a:endParaRPr lang="en-US"/>
           </a:p>
@@ -858,7 +900,7 @@
           <a:p>
             <a:fld id="{EB8F9C6A-9697-4BDA-BFDC-0922C08C1E4F}" type="datetimeFigureOut">
               <a:rPr lang="en-US" smtClean="0"/>
-              <a:t>3/20/2022</a:t>
+              <a:t>3/22/2022</a:t>
             </a:fld>
             <a:endParaRPr lang="en-US"/>
           </a:p>
@@ -1133,7 +1175,7 @@
           <a:p>
             <a:fld id="{EB8F9C6A-9697-4BDA-BFDC-0922C08C1E4F}" type="datetimeFigureOut">
               <a:rPr lang="en-US" smtClean="0"/>
-              <a:t>3/20/2022</a:t>
+              <a:t>3/22/2022</a:t>
             </a:fld>
             <a:endParaRPr lang="en-US"/>
           </a:p>
@@ -1398,7 +1440,7 @@
           <a:p>
             <a:fld id="{EB8F9C6A-9697-4BDA-BFDC-0922C08C1E4F}" type="datetimeFigureOut">
               <a:rPr lang="en-US" smtClean="0"/>
-              <a:t>3/20/2022</a:t>
+              <a:t>3/22/2022</a:t>
             </a:fld>
             <a:endParaRPr lang="en-US"/>
           </a:p>
@@ -1810,7 +1852,7 @@
           <a:p>
             <a:fld id="{EB8F9C6A-9697-4BDA-BFDC-0922C08C1E4F}" type="datetimeFigureOut">
               <a:rPr lang="en-US" smtClean="0"/>
-              <a:t>3/20/2022</a:t>
+              <a:t>3/22/2022</a:t>
             </a:fld>
             <a:endParaRPr lang="en-US"/>
           </a:p>
@@ -1951,7 +1993,7 @@
           <a:p>
             <a:fld id="{EB8F9C6A-9697-4BDA-BFDC-0922C08C1E4F}" type="datetimeFigureOut">
               <a:rPr lang="en-US" smtClean="0"/>
-              <a:t>3/20/2022</a:t>
+              <a:t>3/22/2022</a:t>
             </a:fld>
             <a:endParaRPr lang="en-US"/>
           </a:p>
@@ -2064,7 +2106,7 @@
           <a:p>
             <a:fld id="{EB8F9C6A-9697-4BDA-BFDC-0922C08C1E4F}" type="datetimeFigureOut">
               <a:rPr lang="en-US" smtClean="0"/>
-              <a:t>3/20/2022</a:t>
+              <a:t>3/22/2022</a:t>
             </a:fld>
             <a:endParaRPr lang="en-US"/>
           </a:p>
@@ -2375,7 +2417,7 @@
           <a:p>
             <a:fld id="{EB8F9C6A-9697-4BDA-BFDC-0922C08C1E4F}" type="datetimeFigureOut">
               <a:rPr lang="en-US" smtClean="0"/>
-              <a:t>3/20/2022</a:t>
+              <a:t>3/22/2022</a:t>
             </a:fld>
             <a:endParaRPr lang="en-US"/>
           </a:p>
@@ -2663,7 +2705,7 @@
           <a:p>
             <a:fld id="{EB8F9C6A-9697-4BDA-BFDC-0922C08C1E4F}" type="datetimeFigureOut">
               <a:rPr lang="en-US" smtClean="0"/>
-              <a:t>3/20/2022</a:t>
+              <a:t>3/22/2022</a:t>
             </a:fld>
             <a:endParaRPr lang="en-US"/>
           </a:p>
@@ -2904,7 +2946,7 @@
           <a:p>
             <a:fld id="{EB8F9C6A-9697-4BDA-BFDC-0922C08C1E4F}" type="datetimeFigureOut">
               <a:rPr lang="en-US" smtClean="0"/>
-              <a:t>3/20/2022</a:t>
+              <a:t>3/22/2022</a:t>
             </a:fld>
             <a:endParaRPr lang="en-US"/>
           </a:p>
@@ -3369,7 +3411,7 @@
                 <a:latin typeface="Times New Roman" panose="02020603050405020304" pitchFamily="18" charset="0"/>
                 <a:cs typeface="Times New Roman" panose="02020603050405020304" pitchFamily="18" charset="0"/>
               </a:rPr>
-              <a:t>. a) Proposed field sites along the YRB; b) Ranges of predicted </a:t>
+              <a:t>. Field sites across the YRB that will be sampled in August 2022. The sites have been selected to span a broad range of predicted </a:t>
             </a:r>
             <a:r>
               <a:rPr lang="en-US" sz="2400" dirty="0" err="1">
@@ -3383,7 +3425,7 @@
                 <a:latin typeface="Times New Roman" panose="02020603050405020304" pitchFamily="18" charset="0"/>
                 <a:cs typeface="Times New Roman" panose="02020603050405020304" pitchFamily="18" charset="0"/>
               </a:rPr>
-              <a:t> and stream order in proposed sites.</a:t>
+              <a:t> values.</a:t>
             </a:r>
           </a:p>
         </p:txBody>
@@ -4224,7 +4266,7 @@
                 <a:latin typeface="Arial" panose="020B0604020202020204" pitchFamily="34" charset="0"/>
                 <a:cs typeface="Arial" panose="020B0604020202020204" pitchFamily="34" charset="0"/>
               </a:rPr>
-              <a:t>Ersed</a:t>
+              <a:t>ERsed</a:t>
             </a:r>
             <a:r>
               <a:rPr lang="en-US" b="1" dirty="0">

</xml_diff>